<commit_message>
small changest to Lecture #5
</commit_message>
<xml_diff>
--- a/classes/prog2015/Prog3-Lecture5.pptx
+++ b/classes/prog2015/Prog3-Lecture5.pptx
@@ -240,7 +240,7 @@
             <a:fld id="{C0770E16-1574-44A8-B74D-8A4C61DFBF8C}" type="datetimeFigureOut">
               <a:rPr lang="en-US" smtClean="0"/>
               <a:pPr/>
-              <a:t>9/8/2015</a:t>
+              <a:t>9/12/2015</a:t>
             </a:fld>
             <a:endParaRPr lang="en-US"/>
           </a:p>
@@ -2824,7 +2824,7 @@
             <a:fld id="{1D8BD707-D9CF-40AE-B4C6-C98DA3205C09}" type="datetimeFigureOut">
               <a:rPr lang="en-US" smtClean="0"/>
               <a:pPr/>
-              <a:t>9/8/2015</a:t>
+              <a:t>9/12/2015</a:t>
             </a:fld>
             <a:endParaRPr lang="en-US"/>
           </a:p>
@@ -2991,7 +2991,7 @@
             <a:fld id="{1D8BD707-D9CF-40AE-B4C6-C98DA3205C09}" type="datetimeFigureOut">
               <a:rPr lang="en-US" smtClean="0"/>
               <a:pPr/>
-              <a:t>9/8/2015</a:t>
+              <a:t>9/12/2015</a:t>
             </a:fld>
             <a:endParaRPr lang="en-US"/>
           </a:p>
@@ -3168,7 +3168,7 @@
             <a:fld id="{1D8BD707-D9CF-40AE-B4C6-C98DA3205C09}" type="datetimeFigureOut">
               <a:rPr lang="en-US" smtClean="0"/>
               <a:pPr/>
-              <a:t>9/8/2015</a:t>
+              <a:t>9/12/2015</a:t>
             </a:fld>
             <a:endParaRPr lang="en-US"/>
           </a:p>
@@ -3335,7 +3335,7 @@
             <a:fld id="{1D8BD707-D9CF-40AE-B4C6-C98DA3205C09}" type="datetimeFigureOut">
               <a:rPr lang="en-US" smtClean="0"/>
               <a:pPr/>
-              <a:t>9/8/2015</a:t>
+              <a:t>9/12/2015</a:t>
             </a:fld>
             <a:endParaRPr lang="en-US"/>
           </a:p>
@@ -3578,7 +3578,7 @@
             <a:fld id="{1D8BD707-D9CF-40AE-B4C6-C98DA3205C09}" type="datetimeFigureOut">
               <a:rPr lang="en-US" smtClean="0"/>
               <a:pPr/>
-              <a:t>9/8/2015</a:t>
+              <a:t>9/12/2015</a:t>
             </a:fld>
             <a:endParaRPr lang="en-US"/>
           </a:p>
@@ -3863,7 +3863,7 @@
             <a:fld id="{1D8BD707-D9CF-40AE-B4C6-C98DA3205C09}" type="datetimeFigureOut">
               <a:rPr lang="en-US" smtClean="0"/>
               <a:pPr/>
-              <a:t>9/8/2015</a:t>
+              <a:t>9/12/2015</a:t>
             </a:fld>
             <a:endParaRPr lang="en-US"/>
           </a:p>
@@ -4282,7 +4282,7 @@
             <a:fld id="{1D8BD707-D9CF-40AE-B4C6-C98DA3205C09}" type="datetimeFigureOut">
               <a:rPr lang="en-US" smtClean="0"/>
               <a:pPr/>
-              <a:t>9/8/2015</a:t>
+              <a:t>9/12/2015</a:t>
             </a:fld>
             <a:endParaRPr lang="en-US"/>
           </a:p>
@@ -4397,7 +4397,7 @@
             <a:fld id="{1D8BD707-D9CF-40AE-B4C6-C98DA3205C09}" type="datetimeFigureOut">
               <a:rPr lang="en-US" smtClean="0"/>
               <a:pPr/>
-              <a:t>9/8/2015</a:t>
+              <a:t>9/12/2015</a:t>
             </a:fld>
             <a:endParaRPr lang="en-US"/>
           </a:p>
@@ -4489,7 +4489,7 @@
             <a:fld id="{1D8BD707-D9CF-40AE-B4C6-C98DA3205C09}" type="datetimeFigureOut">
               <a:rPr lang="en-US" smtClean="0"/>
               <a:pPr/>
-              <a:t>9/8/2015</a:t>
+              <a:t>9/12/2015</a:t>
             </a:fld>
             <a:endParaRPr lang="en-US"/>
           </a:p>
@@ -4763,7 +4763,7 @@
             <a:fld id="{1D8BD707-D9CF-40AE-B4C6-C98DA3205C09}" type="datetimeFigureOut">
               <a:rPr lang="en-US" smtClean="0"/>
               <a:pPr/>
-              <a:t>9/8/2015</a:t>
+              <a:t>9/12/2015</a:t>
             </a:fld>
             <a:endParaRPr lang="en-US"/>
           </a:p>
@@ -5013,7 +5013,7 @@
             <a:fld id="{1D8BD707-D9CF-40AE-B4C6-C98DA3205C09}" type="datetimeFigureOut">
               <a:rPr lang="en-US" smtClean="0"/>
               <a:pPr/>
-              <a:t>9/8/2015</a:t>
+              <a:t>9/12/2015</a:t>
             </a:fld>
             <a:endParaRPr lang="en-US"/>
           </a:p>
@@ -5223,7 +5223,7 @@
             <a:fld id="{1D8BD707-D9CF-40AE-B4C6-C98DA3205C09}" type="datetimeFigureOut">
               <a:rPr lang="en-US" smtClean="0"/>
               <a:pPr/>
-              <a:t>9/8/2015</a:t>
+              <a:t>9/12/2015</a:t>
             </a:fld>
             <a:endParaRPr lang="en-US"/>
           </a:p>
@@ -5890,6 +5890,39 @@
           </a:p>
         </p:txBody>
       </p:sp>
+      <p:cxnSp>
+        <p:nvCxnSpPr>
+          <p:cNvPr id="8" name="Straight Arrow Connector 7"/>
+          <p:cNvCxnSpPr/>
+          <p:nvPr/>
+        </p:nvCxnSpPr>
+        <p:spPr>
+          <a:xfrm flipV="1">
+            <a:off x="304800" y="5562600"/>
+            <a:ext cx="762000" cy="228600"/>
+          </a:xfrm>
+          <a:prstGeom prst="straightConnector1">
+            <a:avLst/>
+          </a:prstGeom>
+          <a:ln>
+            <a:tailEnd type="arrow"/>
+          </a:ln>
+        </p:spPr>
+        <p:style>
+          <a:lnRef idx="1">
+            <a:schemeClr val="accent1"/>
+          </a:lnRef>
+          <a:fillRef idx="0">
+            <a:schemeClr val="accent1"/>
+          </a:fillRef>
+          <a:effectRef idx="0">
+            <a:schemeClr val="accent1"/>
+          </a:effectRef>
+          <a:fontRef idx="minor">
+            <a:schemeClr val="tx1"/>
+          </a:fontRef>
+        </p:style>
+      </p:cxnSp>
     </p:spTree>
   </p:cSld>
   <p:clrMapOvr>
@@ -6690,11 +6723,7 @@
           <a:p>
             <a:r>
               <a:rPr lang="en-US" dirty="0" smtClean="0"/>
-              <a:t>It </a:t>
-            </a:r>
-            <a:r>
-              <a:rPr lang="en-US" dirty="0" smtClean="0"/>
-              <a:t>is easy to iterate through the characters in a String</a:t>
+              <a:t>It is easy to iterate through the characters in a String</a:t>
             </a:r>
             <a:endParaRPr lang="en-US" dirty="0"/>
           </a:p>
@@ -9611,11 +9640,7 @@
           <a:p>
             <a:r>
               <a:rPr lang="en-US" dirty="0" smtClean="0"/>
-              <a:t>An upcoming lab will </a:t>
-            </a:r>
-            <a:r>
-              <a:rPr lang="en-US" dirty="0" smtClean="0"/>
-              <a:t>be the dreaded </a:t>
+              <a:t>An upcoming lab will be the dreaded </a:t>
             </a:r>
             <a:r>
               <a:rPr lang="en-US" dirty="0" err="1" smtClean="0"/>

</xml_diff>